<commit_message>
Add activation function notes
</commit_message>
<xml_diff>
--- a/notes/part1-artificial-neural-networks/editable-images.pptx
+++ b/notes/part1-artificial-neural-networks/editable-images.pptx
@@ -3387,7 +3387,7 @@
         <p:spPr>
           <a:xfrm>
             <a:off x="185738" y="6039069"/>
-            <a:ext cx="3394391" cy="646331"/>
+            <a:ext cx="3696205" cy="923330"/>
           </a:xfrm>
           <a:prstGeom prst="rect">
             <a:avLst/>
@@ -3415,6 +3415,13 @@
             <a:r>
               <a:rPr lang="en-US" b="1" dirty="0"/>
               <a:t>observation</a:t>
+            </a:r>
+            <a:br>
+              <a:rPr lang="en-US" b="1" dirty="0"/>
+            </a:br>
+            <a:r>
+              <a:rPr lang="en-US" dirty="0"/>
+              <a:t>(must be standardized or normalized)</a:t>
             </a:r>
             <a:br>
               <a:rPr lang="en-US" b="1" dirty="0"/>

</xml_diff>

<commit_message>
How anns make predictions and how are they trained pt 1
</commit_message>
<xml_diff>
--- a/notes/part1-artificial-neural-networks/editable-images.pptx
+++ b/notes/part1-artificial-neural-networks/editable-images.pptx
@@ -6,6 +6,7 @@
   </p:sldMasterIdLst>
   <p:sldIdLst>
     <p:sldId id="256" r:id="rId2"/>
+    <p:sldId id="257" r:id="rId3"/>
   </p:sldIdLst>
   <p:sldSz cx="12192000" cy="6858000"/>
   <p:notesSz cx="6858000" cy="9144000"/>
@@ -3611,6 +3612,291 @@
 </p:sld>
 </file>
 
+<file path=ppt/slides/slide2.xml><?xml version="1.0" encoding="utf-8"?>
+<p:sld xmlns:a="http://schemas.openxmlformats.org/drawingml/2006/main" xmlns:r="http://schemas.openxmlformats.org/officeDocument/2006/relationships" xmlns:p="http://schemas.openxmlformats.org/presentationml/2006/main">
+  <p:cSld>
+    <p:spTree>
+      <p:nvGrpSpPr>
+        <p:cNvPr id="1" name=""/>
+        <p:cNvGrpSpPr/>
+        <p:nvPr/>
+      </p:nvGrpSpPr>
+      <p:grpSpPr>
+        <a:xfrm>
+          <a:off x="0" y="0"/>
+          <a:ext cx="0" cy="0"/>
+          <a:chOff x="0" y="0"/>
+          <a:chExt cx="0" cy="0"/>
+        </a:xfrm>
+      </p:grpSpPr>
+      <p:pic>
+        <p:nvPicPr>
+          <p:cNvPr id="5" name="Picture 4" descr="A close up of a map&#10;&#10;Description automatically generated">
+            <a:extLst>
+              <a:ext uri="{FF2B5EF4-FFF2-40B4-BE49-F238E27FC236}">
+                <a16:creationId xmlns:a16="http://schemas.microsoft.com/office/drawing/2014/main" id="{C32CE6B9-61B5-8849-AC53-5B1B01C550AA}"/>
+              </a:ext>
+            </a:extLst>
+          </p:cNvPr>
+          <p:cNvPicPr>
+            <a:picLocks noChangeAspect="1"/>
+          </p:cNvPicPr>
+          <p:nvPr/>
+        </p:nvPicPr>
+        <p:blipFill>
+          <a:blip r:embed="rId2"/>
+          <a:stretch>
+            <a:fillRect/>
+          </a:stretch>
+        </p:blipFill>
+        <p:spPr>
+          <a:xfrm>
+            <a:off x="1032617" y="0"/>
+            <a:ext cx="10126766" cy="6858000"/>
+          </a:xfrm>
+          <a:prstGeom prst="rect">
+            <a:avLst/>
+          </a:prstGeom>
+        </p:spPr>
+      </p:pic>
+      <p:sp>
+        <p:nvSpPr>
+          <p:cNvPr id="6" name="TextBox 5">
+            <a:extLst>
+              <a:ext uri="{FF2B5EF4-FFF2-40B4-BE49-F238E27FC236}">
+                <a16:creationId xmlns:a16="http://schemas.microsoft.com/office/drawing/2014/main" id="{44903523-06F9-8346-AB54-4B76DF0CAE8D}"/>
+              </a:ext>
+            </a:extLst>
+          </p:cNvPr>
+          <p:cNvSpPr txBox="1"/>
+          <p:nvPr/>
+        </p:nvSpPr>
+        <p:spPr>
+          <a:xfrm>
+            <a:off x="176212" y="184133"/>
+            <a:ext cx="4384790" cy="461665"/>
+          </a:xfrm>
+          <a:prstGeom prst="rect">
+            <a:avLst/>
+          </a:prstGeom>
+          <a:noFill/>
+        </p:spPr>
+        <p:txBody>
+          <a:bodyPr wrap="none" rtlCol="0">
+            <a:spAutoFit/>
+          </a:bodyPr>
+          <a:lstStyle/>
+          <a:p>
+            <a:r>
+              <a:rPr lang="en-US" sz="2400" b="1" dirty="0"/>
+              <a:t>PREDICTION OF PROPERTY PRICE</a:t>
+            </a:r>
+          </a:p>
+        </p:txBody>
+      </p:sp>
+      <p:sp>
+        <p:nvSpPr>
+          <p:cNvPr id="7" name="TextBox 6">
+            <a:extLst>
+              <a:ext uri="{FF2B5EF4-FFF2-40B4-BE49-F238E27FC236}">
+                <a16:creationId xmlns:a16="http://schemas.microsoft.com/office/drawing/2014/main" id="{A9CA47EC-46C4-9241-A864-AD2D64077226}"/>
+              </a:ext>
+            </a:extLst>
+          </p:cNvPr>
+          <p:cNvSpPr txBox="1"/>
+          <p:nvPr/>
+        </p:nvSpPr>
+        <p:spPr>
+          <a:xfrm>
+            <a:off x="7962213" y="0"/>
+            <a:ext cx="4053575" cy="923330"/>
+          </a:xfrm>
+          <a:prstGeom prst="rect">
+            <a:avLst/>
+          </a:prstGeom>
+          <a:noFill/>
+        </p:spPr>
+        <p:txBody>
+          <a:bodyPr wrap="square" rtlCol="0">
+            <a:spAutoFit/>
+          </a:bodyPr>
+          <a:lstStyle/>
+          <a:p>
+            <a:r>
+              <a:rPr lang="en-US" dirty="0"/>
+              <a:t>This neuron has learned that the combination of </a:t>
+            </a:r>
+            <a:r>
+              <a:rPr lang="en-US" b="1" dirty="0"/>
+              <a:t>area</a:t>
+            </a:r>
+            <a:r>
+              <a:rPr lang="en-US" dirty="0"/>
+              <a:t> and </a:t>
+            </a:r>
+            <a:r>
+              <a:rPr lang="en-US" b="1" dirty="0"/>
+              <a:t>distance</a:t>
+            </a:r>
+            <a:r>
+              <a:rPr lang="en-US" dirty="0"/>
+              <a:t> plays a role in price</a:t>
+            </a:r>
+          </a:p>
+        </p:txBody>
+      </p:sp>
+      <p:sp>
+        <p:nvSpPr>
+          <p:cNvPr id="8" name="TextBox 7">
+            <a:extLst>
+              <a:ext uri="{FF2B5EF4-FFF2-40B4-BE49-F238E27FC236}">
+                <a16:creationId xmlns:a16="http://schemas.microsoft.com/office/drawing/2014/main" id="{04947F74-D0D0-BA47-94F1-B9B153B3CCDE}"/>
+              </a:ext>
+            </a:extLst>
+          </p:cNvPr>
+          <p:cNvSpPr txBox="1"/>
+          <p:nvPr/>
+        </p:nvSpPr>
+        <p:spPr>
+          <a:xfrm>
+            <a:off x="8138425" y="3609976"/>
+            <a:ext cx="4053575" cy="1200329"/>
+          </a:xfrm>
+          <a:prstGeom prst="rect">
+            <a:avLst/>
+          </a:prstGeom>
+          <a:noFill/>
+        </p:spPr>
+        <p:txBody>
+          <a:bodyPr wrap="square" rtlCol="0">
+            <a:spAutoFit/>
+          </a:bodyPr>
+          <a:lstStyle/>
+          <a:p>
+            <a:r>
+              <a:rPr lang="en-US" dirty="0"/>
+              <a:t>Through a </a:t>
+            </a:r>
+            <a:r>
+              <a:rPr lang="en-US" b="1" dirty="0"/>
+              <a:t>rectifier</a:t>
+            </a:r>
+            <a:r>
+              <a:rPr lang="en-US" dirty="0"/>
+              <a:t> </a:t>
+            </a:r>
+            <a:r>
+              <a:rPr lang="en-US" b="1" dirty="0"/>
+              <a:t>function</a:t>
+            </a:r>
+            <a:r>
+              <a:rPr lang="en-US" dirty="0"/>
+              <a:t>, this neuron has learned that after certain </a:t>
+            </a:r>
+            <a:r>
+              <a:rPr lang="en-US" b="1" dirty="0"/>
+              <a:t>age</a:t>
+            </a:r>
+            <a:r>
+              <a:rPr lang="en-US" dirty="0"/>
+              <a:t>, buildings become historic and that drives price</a:t>
+            </a:r>
+          </a:p>
+        </p:txBody>
+      </p:sp>
+      <p:sp>
+        <p:nvSpPr>
+          <p:cNvPr id="9" name="TextBox 8">
+            <a:extLst>
+              <a:ext uri="{FF2B5EF4-FFF2-40B4-BE49-F238E27FC236}">
+                <a16:creationId xmlns:a16="http://schemas.microsoft.com/office/drawing/2014/main" id="{232D319F-85D5-D04B-BEE9-8DD8065551DC}"/>
+              </a:ext>
+            </a:extLst>
+          </p:cNvPr>
+          <p:cNvSpPr txBox="1"/>
+          <p:nvPr/>
+        </p:nvSpPr>
+        <p:spPr>
+          <a:xfrm>
+            <a:off x="280988" y="6016188"/>
+            <a:ext cx="3576637" cy="646331"/>
+          </a:xfrm>
+          <a:prstGeom prst="rect">
+            <a:avLst/>
+          </a:prstGeom>
+          <a:noFill/>
+        </p:spPr>
+        <p:txBody>
+          <a:bodyPr wrap="square" rtlCol="0">
+            <a:spAutoFit/>
+          </a:bodyPr>
+          <a:lstStyle/>
+          <a:p>
+            <a:r>
+              <a:rPr lang="en-US" dirty="0"/>
+              <a:t>* No arrow means, weight = 0 for that input neuron</a:t>
+            </a:r>
+          </a:p>
+        </p:txBody>
+      </p:sp>
+      <p:cxnSp>
+        <p:nvCxnSpPr>
+          <p:cNvPr id="11" name="Straight Arrow Connector 10">
+            <a:extLst>
+              <a:ext uri="{FF2B5EF4-FFF2-40B4-BE49-F238E27FC236}">
+                <a16:creationId xmlns:a16="http://schemas.microsoft.com/office/drawing/2014/main" id="{784603BC-A039-BF4A-A024-9B45E02458E9}"/>
+              </a:ext>
+            </a:extLst>
+          </p:cNvPr>
+          <p:cNvCxnSpPr/>
+          <p:nvPr/>
+        </p:nvCxnSpPr>
+        <p:spPr>
+          <a:xfrm flipV="1">
+            <a:off x="7415213" y="4210140"/>
+            <a:ext cx="723212" cy="1361985"/>
+          </a:xfrm>
+          <a:prstGeom prst="straightConnector1">
+            <a:avLst/>
+          </a:prstGeom>
+          <a:ln>
+            <a:solidFill>
+              <a:schemeClr val="tx1">
+                <a:lumMod val="75000"/>
+                <a:lumOff val="25000"/>
+              </a:schemeClr>
+            </a:solidFill>
+            <a:tailEnd type="triangle"/>
+          </a:ln>
+        </p:spPr>
+        <p:style>
+          <a:lnRef idx="1">
+            <a:schemeClr val="accent1"/>
+          </a:lnRef>
+          <a:fillRef idx="0">
+            <a:schemeClr val="accent1"/>
+          </a:fillRef>
+          <a:effectRef idx="0">
+            <a:schemeClr val="accent1"/>
+          </a:effectRef>
+          <a:fontRef idx="minor">
+            <a:schemeClr val="tx1"/>
+          </a:fontRef>
+        </p:style>
+      </p:cxnSp>
+    </p:spTree>
+    <p:extLst>
+      <p:ext uri="{BB962C8B-B14F-4D97-AF65-F5344CB8AC3E}">
+        <p14:creationId xmlns:p14="http://schemas.microsoft.com/office/powerpoint/2010/main" val="2912279356"/>
+      </p:ext>
+    </p:extLst>
+  </p:cSld>
+  <p:clrMapOvr>
+    <a:masterClrMapping/>
+  </p:clrMapOvr>
+</p:sld>
+</file>
+
 <file path=ppt/theme/theme1.xml><?xml version="1.0" encoding="utf-8"?>
 <a:theme xmlns:a="http://schemas.openxmlformats.org/drawingml/2006/main" name="Office Theme">
   <a:themeElements>

</xml_diff>